<commit_message>
Introdução - Scripts 2018.1
</commit_message>
<xml_diff>
--- a/AutomacaoComScripts/Aula01-Introducao/01-Introducao.pptx
+++ b/AutomacaoComScripts/Aula01-Introducao/01-Introducao.pptx
@@ -260,7 +260,7 @@
               <a:pPr>
                 <a:defRPr/>
               </a:pPr>
-              <a:t>02/02/2017</a:t>
+              <a:t>12/02/2018</a:t>
             </a:fld>
             <a:endParaRPr lang="pt-BR"/>
           </a:p>
@@ -902,7 +902,7 @@
               <a:pPr>
                 <a:defRPr/>
               </a:pPr>
-              <a:t>02/02/2017</a:t>
+              <a:t>12/02/2018</a:t>
             </a:fld>
             <a:endParaRPr lang="pt-BR"/>
           </a:p>
@@ -1272,7 +1272,7 @@
               <a:pPr>
                 <a:defRPr/>
               </a:pPr>
-              <a:t>02/02/2017</a:t>
+              <a:t>12/02/2018</a:t>
             </a:fld>
             <a:endParaRPr lang="pt-BR"/>
           </a:p>
@@ -1474,7 +1474,7 @@
               <a:pPr>
                 <a:defRPr/>
               </a:pPr>
-              <a:t>02/02/2017</a:t>
+              <a:t>12/02/2018</a:t>
             </a:fld>
             <a:endParaRPr lang="pt-BR"/>
           </a:p>
@@ -1738,7 +1738,7 @@
               <a:pPr>
                 <a:defRPr/>
               </a:pPr>
-              <a:t>02/02/2017</a:t>
+              <a:t>12/02/2018</a:t>
             </a:fld>
             <a:endParaRPr lang="pt-BR"/>
           </a:p>
@@ -1930,7 +1930,7 @@
               <a:pPr>
                 <a:defRPr/>
               </a:pPr>
-              <a:t>02/02/2017</a:t>
+              <a:t>12/02/2018</a:t>
             </a:fld>
             <a:endParaRPr lang="pt-BR"/>
           </a:p>
@@ -2198,7 +2198,7 @@
               <a:pPr>
                 <a:defRPr/>
               </a:pPr>
-              <a:t>02/02/2017</a:t>
+              <a:t>12/02/2018</a:t>
             </a:fld>
             <a:endParaRPr lang="pt-BR"/>
           </a:p>
@@ -2508,7 +2508,7 @@
               <a:pPr>
                 <a:defRPr/>
               </a:pPr>
-              <a:t>02/02/2017</a:t>
+              <a:t>12/02/2018</a:t>
             </a:fld>
             <a:endParaRPr lang="pt-BR"/>
           </a:p>
@@ -2952,7 +2952,7 @@
               <a:pPr>
                 <a:defRPr/>
               </a:pPr>
-              <a:t>02/02/2017</a:t>
+              <a:t>12/02/2018</a:t>
             </a:fld>
             <a:endParaRPr lang="pt-BR"/>
           </a:p>
@@ -3092,7 +3092,7 @@
               <a:pPr>
                 <a:defRPr/>
               </a:pPr>
-              <a:t>02/02/2017</a:t>
+              <a:t>12/02/2018</a:t>
             </a:fld>
             <a:endParaRPr lang="pt-BR"/>
           </a:p>
@@ -3209,7 +3209,7 @@
               <a:pPr>
                 <a:defRPr/>
               </a:pPr>
-              <a:t>02/02/2017</a:t>
+              <a:t>12/02/2018</a:t>
             </a:fld>
             <a:endParaRPr lang="pt-BR"/>
           </a:p>
@@ -3401,7 +3401,7 @@
               <a:pPr>
                 <a:defRPr/>
               </a:pPr>
-              <a:t>02/02/2017</a:t>
+              <a:t>12/02/2018</a:t>
             </a:fld>
             <a:endParaRPr lang="pt-BR"/>
           </a:p>
@@ -3700,7 +3700,7 @@
               <a:pPr>
                 <a:defRPr/>
               </a:pPr>
-              <a:t>02/02/2017</a:t>
+              <a:t>12/02/2018</a:t>
             </a:fld>
             <a:endParaRPr lang="pt-BR"/>
           </a:p>
@@ -3978,7 +3978,7 @@
               <a:pPr>
                 <a:defRPr/>
               </a:pPr>
-              <a:t>02/02/2017</a:t>
+              <a:t>12/02/2018</a:t>
             </a:fld>
             <a:endParaRPr lang="pt-BR"/>
           </a:p>
@@ -4170,7 +4170,7 @@
               <a:pPr>
                 <a:defRPr/>
               </a:pPr>
-              <a:t>02/02/2017</a:t>
+              <a:t>12/02/2018</a:t>
             </a:fld>
             <a:endParaRPr lang="pt-BR"/>
           </a:p>
@@ -4372,7 +4372,7 @@
               <a:pPr>
                 <a:defRPr/>
               </a:pPr>
-              <a:t>02/02/2017</a:t>
+              <a:t>12/02/2018</a:t>
             </a:fld>
             <a:endParaRPr lang="pt-BR"/>
           </a:p>
@@ -4640,7 +4640,7 @@
               <a:pPr>
                 <a:defRPr/>
               </a:pPr>
-              <a:t>02/02/2017</a:t>
+              <a:t>12/02/2018</a:t>
             </a:fld>
             <a:endParaRPr lang="pt-BR"/>
           </a:p>
@@ -4950,7 +4950,7 @@
               <a:pPr>
                 <a:defRPr/>
               </a:pPr>
-              <a:t>02/02/2017</a:t>
+              <a:t>12/02/2018</a:t>
             </a:fld>
             <a:endParaRPr lang="pt-BR"/>
           </a:p>
@@ -5394,7 +5394,7 @@
               <a:pPr>
                 <a:defRPr/>
               </a:pPr>
-              <a:t>02/02/2017</a:t>
+              <a:t>12/02/2018</a:t>
             </a:fld>
             <a:endParaRPr lang="pt-BR"/>
           </a:p>
@@ -5534,7 +5534,7 @@
               <a:pPr>
                 <a:defRPr/>
               </a:pPr>
-              <a:t>02/02/2017</a:t>
+              <a:t>12/02/2018</a:t>
             </a:fld>
             <a:endParaRPr lang="pt-BR"/>
           </a:p>
@@ -5651,7 +5651,7 @@
               <a:pPr>
                 <a:defRPr/>
               </a:pPr>
-              <a:t>02/02/2017</a:t>
+              <a:t>12/02/2018</a:t>
             </a:fld>
             <a:endParaRPr lang="pt-BR"/>
           </a:p>
@@ -5950,7 +5950,7 @@
               <a:pPr>
                 <a:defRPr/>
               </a:pPr>
-              <a:t>02/02/2017</a:t>
+              <a:t>12/02/2018</a:t>
             </a:fld>
             <a:endParaRPr lang="pt-BR"/>
           </a:p>
@@ -6257,7 +6257,7 @@
               <a:pPr>
                 <a:defRPr/>
               </a:pPr>
-              <a:t>02/02/2017</a:t>
+              <a:t>12/02/2018</a:t>
             </a:fld>
             <a:endParaRPr lang="pt-BR"/>
           </a:p>
@@ -6513,7 +6513,7 @@
               <a:pPr>
                 <a:defRPr/>
               </a:pPr>
-              <a:t>02/02/2017</a:t>
+              <a:t>12/02/2018</a:t>
             </a:fld>
             <a:endParaRPr lang="pt-BR"/>
           </a:p>
@@ -7262,7 +7262,7 @@
               <a:pPr>
                 <a:defRPr/>
               </a:pPr>
-              <a:t>02/02/2017</a:t>
+              <a:t>12/02/2018</a:t>
             </a:fld>
             <a:endParaRPr lang="pt-BR"/>
           </a:p>
@@ -7826,7 +7826,7 @@
                 <a:latin typeface="+mn-lt"/>
                 <a:cs typeface="Arial" pitchFamily="34" charset="0"/>
               </a:rPr>
-              <a:t>02</a:t>
+              <a:t>23</a:t>
             </a:r>
             <a:r>
               <a:rPr lang="pt-BR" sz="2200" b="1" dirty="0" smtClean="0">
@@ -7876,7 +7876,7 @@
                 <a:latin typeface="+mn-lt"/>
                 <a:cs typeface="Arial" pitchFamily="34" charset="0"/>
               </a:rPr>
-              <a:t>2017</a:t>
+              <a:t>2018</a:t>
             </a:r>
             <a:endParaRPr lang="pt-BR" sz="2200" b="1" dirty="0">
               <a:solidFill>
@@ -8218,36 +8218,20 @@
                   <a:schemeClr val="accent2"/>
                 </a:solidFill>
               </a:rPr>
-              <a:t>                     </a:t>
-            </a:r>
+              <a:t>                     Introdução</a:t>
+            </a:r>
+          </a:p>
+          <a:p>
+            <a:pPr eaLnBrk="1" hangingPunct="1">
+              <a:defRPr/>
+            </a:pPr>
             <a:r>
               <a:rPr lang="pt-BR" altLang="pt-BR" sz="2800" b="1" dirty="0" smtClean="0">
                 <a:solidFill>
                   <a:schemeClr val="accent2"/>
                 </a:solidFill>
               </a:rPr>
-              <a:t>Introdução</a:t>
-            </a:r>
-          </a:p>
-          <a:p>
-            <a:pPr eaLnBrk="1" hangingPunct="1">
-              <a:defRPr/>
-            </a:pPr>
-            <a:r>
-              <a:rPr lang="pt-BR" altLang="pt-BR" sz="2800" b="1" dirty="0" smtClean="0">
-                <a:solidFill>
-                  <a:schemeClr val="accent2"/>
-                </a:solidFill>
-              </a:rPr>
-              <a:t>	</a:t>
-            </a:r>
-            <a:r>
-              <a:rPr lang="pt-BR" altLang="pt-BR" sz="2800" b="1" dirty="0" smtClean="0">
-                <a:solidFill>
-                  <a:schemeClr val="accent2"/>
-                </a:solidFill>
-              </a:rPr>
-              <a:t>	  </a:t>
+              <a:t>		  </a:t>
             </a:r>
             <a:r>
               <a:rPr lang="pt-BR" altLang="pt-BR" sz="2000" b="1" dirty="0" smtClean="0">
@@ -8464,7 +8448,7 @@
 </file>
 
 <file path=ppt/slides/slide10.xml><?xml version="1.0" encoding="utf-8"?>
-<p:sld xmlns:a="http://schemas.openxmlformats.org/drawingml/2006/main" xmlns:r="http://schemas.openxmlformats.org/officeDocument/2006/relationships" xmlns:p="http://schemas.openxmlformats.org/presentationml/2006/main">
+<p:sld xmlns:a="http://schemas.openxmlformats.org/drawingml/2006/main" xmlns:r="http://schemas.openxmlformats.org/officeDocument/2006/relationships" xmlns:p="http://schemas.openxmlformats.org/presentationml/2006/main" show="0">
   <p:cSld>
     <p:spTree>
       <p:nvGrpSpPr>
@@ -8559,6 +8543,7 @@
   <p:clrMapOvr>
     <a:masterClrMapping/>
   </p:clrMapOvr>
+  <p:transition/>
 </p:sld>
 </file>
 
@@ -8626,10 +8611,35 @@
           <a:p>
             <a:pPr lvl="1"/>
             <a:r>
+              <a:rPr lang="pt-BR" sz="1600" dirty="0" smtClean="0"/>
+              <a:t>https</a:t>
+            </a:r>
+            <a:r>
+              <a:rPr lang="pt-BR" sz="1600" dirty="0" smtClean="0"/>
+              <a:t>://www.devmedia.com.br/introducao-ao-shell-script-no-linux/25778</a:t>
+            </a:r>
+            <a:endParaRPr lang="pt-BR" sz="1600" dirty="0" smtClean="0"/>
+          </a:p>
+          <a:p>
+            <a:pPr lvl="1"/>
+            <a:r>
+              <a:rPr lang="pt-BR" sz="1600" dirty="0" smtClean="0"/>
+              <a:t>https://www.vivaolinux.com.br/dica/Comandos-de-rede-Linux-(basico)</a:t>
+            </a:r>
+          </a:p>
+          <a:p>
+            <a:r>
+              <a:rPr lang="pt-BR" sz="1800" dirty="0" smtClean="0"/>
+              <a:t>Python.org</a:t>
+            </a:r>
+          </a:p>
+          <a:p>
+            <a:pPr lvl="1"/>
+            <a:r>
               <a:rPr lang="pt-BR" sz="1600" dirty="0" smtClean="0">
                 <a:hlinkClick r:id="rId2"/>
               </a:rPr>
-              <a:t>http://www.devmedia.com.br/introducao-ao-shell-script-no-linux/25778</a:t>
+              <a:t>https://www.python.org/downloads/</a:t>
             </a:r>
             <a:endParaRPr lang="pt-BR" sz="1600" dirty="0" smtClean="0"/>
           </a:p>
@@ -8637,36 +8647,12 @@
             <a:pPr lvl="1"/>
             <a:r>
               <a:rPr lang="pt-BR" sz="1600" dirty="0" smtClean="0"/>
-              <a:t>https://www.vivaolinux.com.br/dica/Comandos-de-rede-Linux-(basico)</a:t>
-            </a:r>
-          </a:p>
-          <a:p>
-            <a:r>
-              <a:rPr lang="pt-BR" sz="1800" dirty="0" smtClean="0"/>
-              <a:t>Python.org</a:t>
-            </a:r>
-          </a:p>
-          <a:p>
-            <a:pPr lvl="1"/>
-            <a:r>
-              <a:rPr lang="pt-BR" sz="1600" dirty="0" smtClean="0">
-                <a:hlinkClick r:id="rId3"/>
-              </a:rPr>
-              <a:t>https://www.python.org/downloads/</a:t>
-            </a:r>
-            <a:endParaRPr lang="pt-BR" sz="1600" dirty="0" smtClean="0"/>
-          </a:p>
-          <a:p>
-            <a:pPr lvl="1"/>
+              <a:t>http</a:t>
+            </a:r>
             <a:r>
               <a:rPr lang="pt-BR" sz="1600" dirty="0" smtClean="0"/>
-              <a:t>http://</a:t>
-            </a:r>
-            <a:r>
-              <a:rPr lang="pt-BR" sz="1600" dirty="0" smtClean="0"/>
-              <a:t>wiki.python.org.br/PerguntasFrequentes/SobrePython</a:t>
-            </a:r>
-            <a:endParaRPr lang="pt-BR" sz="1600" dirty="0" smtClean="0"/>
+              <a:t>://wiki.python.org.br/PerguntasFrequentes/SobrePython</a:t>
+            </a:r>
           </a:p>
         </p:txBody>
       </p:sp>
@@ -8748,11 +8734,7 @@
           <a:p>
             <a:r>
               <a:rPr lang="pt-BR" dirty="0" smtClean="0"/>
-              <a:t>Dia a dia </a:t>
-            </a:r>
-            <a:r>
-              <a:rPr lang="pt-BR" dirty="0" smtClean="0"/>
-              <a:t>do trabalho do gerente de TI</a:t>
+              <a:t>Dia a dia do trabalho do gerente de TI</a:t>
             </a:r>
           </a:p>
           <a:p>
@@ -8787,13 +8769,6 @@
             <a:r>
               <a:rPr lang="pt-BR" dirty="0" smtClean="0"/>
               <a:t>Python</a:t>
-            </a:r>
-          </a:p>
-          <a:p>
-            <a:pPr lvl="2"/>
-            <a:r>
-              <a:rPr lang="pt-BR" dirty="0" smtClean="0"/>
-              <a:t>Se der tempo – avaliação de performance com locust</a:t>
             </a:r>
           </a:p>
           <a:p>
@@ -8891,11 +8866,7 @@
           <a:p>
             <a:r>
               <a:rPr lang="pt-BR" dirty="0" smtClean="0"/>
-              <a:t>Suporte </a:t>
-            </a:r>
-            <a:r>
-              <a:rPr lang="pt-BR" dirty="0" smtClean="0"/>
-              <a:t>na comunidade de redes</a:t>
+              <a:t>Suporte na comunidade de redes</a:t>
             </a:r>
           </a:p>
           <a:p>

</xml_diff>